<commit_message>
Fixing indexes for Avillach
</commit_message>
<xml_diff>
--- a/documentation/CEM_OVERVIEW.pptx
+++ b/documentation/CEM_OVERVIEW.pptx
@@ -140,6 +140,10 @@
 </p:cmAuthorLst>
 </file>
 
+<file path=ppt/revisionInfo.xml><?xml version="1.0" encoding="utf-8"?>
+<p1510:revInfo xmlns:a="http://schemas.openxmlformats.org/drawingml/2006/main" xmlns:r="http://schemas.openxmlformats.org/officeDocument/2006/relationships" xmlns:p1510="http://schemas.microsoft.com/office/powerpoint/2015/10/main"/>
+</file>
+
 <file path=ppt/slideLayouts/slideLayout1.xml><?xml version="1.0" encoding="utf-8"?>
 <p:sldLayout xmlns:a="http://schemas.openxmlformats.org/drawingml/2006/main" xmlns:r="http://schemas.openxmlformats.org/officeDocument/2006/relationships" xmlns:p="http://schemas.openxmlformats.org/presentationml/2006/main" type="title" preserve="1">
   <p:cSld name="Title Slide">
@@ -269,7 +273,7 @@
           <a:p>
             <a:fld id="{9E18F0FB-9D42-4932-8F40-C123E43686DB}" type="datetimeFigureOut">
               <a:rPr lang="en-US" smtClean="0"/>
-              <a:t>11/8/2017</a:t>
+              <a:t>11/9/2017</a:t>
             </a:fld>
             <a:endParaRPr lang="en-US"/>
           </a:p>
@@ -437,7 +441,7 @@
           <a:p>
             <a:fld id="{9E18F0FB-9D42-4932-8F40-C123E43686DB}" type="datetimeFigureOut">
               <a:rPr lang="en-US" smtClean="0"/>
-              <a:t>11/8/2017</a:t>
+              <a:t>11/9/2017</a:t>
             </a:fld>
             <a:endParaRPr lang="en-US"/>
           </a:p>
@@ -615,7 +619,7 @@
           <a:p>
             <a:fld id="{9E18F0FB-9D42-4932-8F40-C123E43686DB}" type="datetimeFigureOut">
               <a:rPr lang="en-US" smtClean="0"/>
-              <a:t>11/8/2017</a:t>
+              <a:t>11/9/2017</a:t>
             </a:fld>
             <a:endParaRPr lang="en-US"/>
           </a:p>
@@ -783,7 +787,7 @@
           <a:p>
             <a:fld id="{9E18F0FB-9D42-4932-8F40-C123E43686DB}" type="datetimeFigureOut">
               <a:rPr lang="en-US" smtClean="0"/>
-              <a:t>11/8/2017</a:t>
+              <a:t>11/9/2017</a:t>
             </a:fld>
             <a:endParaRPr lang="en-US"/>
           </a:p>
@@ -1028,7 +1032,7 @@
           <a:p>
             <a:fld id="{9E18F0FB-9D42-4932-8F40-C123E43686DB}" type="datetimeFigureOut">
               <a:rPr lang="en-US" smtClean="0"/>
-              <a:t>11/8/2017</a:t>
+              <a:t>11/9/2017</a:t>
             </a:fld>
             <a:endParaRPr lang="en-US"/>
           </a:p>
@@ -1257,7 +1261,7 @@
           <a:p>
             <a:fld id="{9E18F0FB-9D42-4932-8F40-C123E43686DB}" type="datetimeFigureOut">
               <a:rPr lang="en-US" smtClean="0"/>
-              <a:t>11/8/2017</a:t>
+              <a:t>11/9/2017</a:t>
             </a:fld>
             <a:endParaRPr lang="en-US"/>
           </a:p>
@@ -1621,7 +1625,7 @@
           <a:p>
             <a:fld id="{9E18F0FB-9D42-4932-8F40-C123E43686DB}" type="datetimeFigureOut">
               <a:rPr lang="en-US" smtClean="0"/>
-              <a:t>11/8/2017</a:t>
+              <a:t>11/9/2017</a:t>
             </a:fld>
             <a:endParaRPr lang="en-US"/>
           </a:p>
@@ -1738,7 +1742,7 @@
           <a:p>
             <a:fld id="{9E18F0FB-9D42-4932-8F40-C123E43686DB}" type="datetimeFigureOut">
               <a:rPr lang="en-US" smtClean="0"/>
-              <a:t>11/8/2017</a:t>
+              <a:t>11/9/2017</a:t>
             </a:fld>
             <a:endParaRPr lang="en-US"/>
           </a:p>
@@ -1833,7 +1837,7 @@
           <a:p>
             <a:fld id="{9E18F0FB-9D42-4932-8F40-C123E43686DB}" type="datetimeFigureOut">
               <a:rPr lang="en-US" smtClean="0"/>
-              <a:t>11/8/2017</a:t>
+              <a:t>11/9/2017</a:t>
             </a:fld>
             <a:endParaRPr lang="en-US"/>
           </a:p>
@@ -2108,7 +2112,7 @@
           <a:p>
             <a:fld id="{9E18F0FB-9D42-4932-8F40-C123E43686DB}" type="datetimeFigureOut">
               <a:rPr lang="en-US" smtClean="0"/>
-              <a:t>11/8/2017</a:t>
+              <a:t>11/9/2017</a:t>
             </a:fld>
             <a:endParaRPr lang="en-US"/>
           </a:p>
@@ -2360,7 +2364,7 @@
           <a:p>
             <a:fld id="{9E18F0FB-9D42-4932-8F40-C123E43686DB}" type="datetimeFigureOut">
               <a:rPr lang="en-US" smtClean="0"/>
-              <a:t>11/8/2017</a:t>
+              <a:t>11/9/2017</a:t>
             </a:fld>
             <a:endParaRPr lang="en-US"/>
           </a:p>
@@ -2571,7 +2575,7 @@
           <a:p>
             <a:fld id="{9E18F0FB-9D42-4932-8F40-C123E43686DB}" type="datetimeFigureOut">
               <a:rPr lang="en-US" smtClean="0"/>
-              <a:t>11/8/2017</a:t>
+              <a:t>11/9/2017</a:t>
             </a:fld>
             <a:endParaRPr lang="en-US"/>
           </a:p>
@@ -4854,7 +4858,7 @@
             <a:pPr algn="ctr"/>
             <a:r>
               <a:rPr lang="en-US" sz="1050" dirty="0"/>
-              <a:t>.results.</a:t>
+              <a:t>.evidence.</a:t>
             </a:r>
           </a:p>
         </p:txBody>

</xml_diff>